<commit_message>
Updated powerpoint and design spec
</commit_message>
<xml_diff>
--- a/LTU billboard.pptx
+++ b/LTU billboard.pptx
@@ -112,6 +112,11 @@
       </a:defRPr>
     </a:lvl9pPr>
   </p:defaultTextStyle>
+  <p:extLst>
+    <p:ext uri="{EFAFB233-063F-42B5-8137-9DF3F51BA10A}">
+      <p15:sldGuideLst xmlns:p15="http://schemas.microsoft.com/office/powerpoint/2012/main"/>
+    </p:ext>
+  </p:extLst>
 </p:presentation>
 </file>
 
@@ -165,7 +170,7 @@
           <a:noFill/>
           <a:extLst>
             <a:ext uri="{909E8E84-426E-40dd-AFC4-6F175D3DCCD1}">
-              <a14:hiddenFill xmlns:a14="http://schemas.microsoft.com/office/drawing/2010/main" xmlns="">
+              <a14:hiddenFill xmlns="" xmlns:a14="http://schemas.microsoft.com/office/drawing/2010/main">
                 <a:solidFill>
                   <a:srgbClr val="FFFFFF"/>
                 </a:solidFill>
@@ -225,7 +230,7 @@
             </a:ln>
             <a:extLst>
               <a:ext uri="{91240B29-F687-4f45-9708-019B960494DF}">
-                <a14:hiddenLine xmlns:a14="http://schemas.microsoft.com/office/drawing/2010/main" xmlns="" w="9525">
+                <a14:hiddenLine xmlns="" xmlns:a14="http://schemas.microsoft.com/office/drawing/2010/main" w="9525">
                   <a:solidFill>
                     <a:srgbClr val="000000"/>
                   </a:solidFill>
@@ -315,7 +320,7 @@
             </a:ln>
             <a:extLst>
               <a:ext uri="{91240B29-F687-4f45-9708-019B960494DF}">
-                <a14:hiddenLine xmlns:a14="http://schemas.microsoft.com/office/drawing/2010/main" xmlns="" w="9525">
+                <a14:hiddenLine xmlns="" xmlns:a14="http://schemas.microsoft.com/office/drawing/2010/main" w="9525">
                   <a:solidFill>
                     <a:srgbClr val="000000"/>
                   </a:solidFill>
@@ -405,7 +410,7 @@
             </a:ln>
             <a:extLst>
               <a:ext uri="{91240B29-F687-4f45-9708-019B960494DF}">
-                <a14:hiddenLine xmlns:a14="http://schemas.microsoft.com/office/drawing/2010/main" xmlns="" w="9525">
+                <a14:hiddenLine xmlns="" xmlns:a14="http://schemas.microsoft.com/office/drawing/2010/main" w="9525">
                   <a:solidFill>
                     <a:srgbClr val="000000"/>
                   </a:solidFill>
@@ -439,7 +444,7 @@
             </a:ln>
             <a:extLst>
               <a:ext uri="{91240B29-F687-4f45-9708-019B960494DF}">
-                <a14:hiddenLine xmlns:a14="http://schemas.microsoft.com/office/drawing/2010/main" xmlns="" w="9525">
+                <a14:hiddenLine xmlns="" xmlns:a14="http://schemas.microsoft.com/office/drawing/2010/main" w="9525">
                   <a:solidFill>
                     <a:srgbClr val="000000"/>
                   </a:solidFill>
@@ -529,7 +534,7 @@
             </a:ln>
             <a:extLst>
               <a:ext uri="{91240B29-F687-4f45-9708-019B960494DF}">
-                <a14:hiddenLine xmlns:a14="http://schemas.microsoft.com/office/drawing/2010/main" xmlns="" w="9525">
+                <a14:hiddenLine xmlns="" xmlns:a14="http://schemas.microsoft.com/office/drawing/2010/main" w="9525">
                   <a:solidFill>
                     <a:srgbClr val="000000"/>
                   </a:solidFill>
@@ -591,7 +596,7 @@
             </a:ln>
             <a:extLst>
               <a:ext uri="{91240B29-F687-4f45-9708-019B960494DF}">
-                <a14:hiddenLine xmlns:a14="http://schemas.microsoft.com/office/drawing/2010/main" xmlns="" w="9525">
+                <a14:hiddenLine xmlns="" xmlns:a14="http://schemas.microsoft.com/office/drawing/2010/main" w="9525">
                   <a:solidFill>
                     <a:srgbClr val="000000"/>
                   </a:solidFill>
@@ -653,7 +658,7 @@
             </a:ln>
             <a:extLst>
               <a:ext uri="{91240B29-F687-4f45-9708-019B960494DF}">
-                <a14:hiddenLine xmlns:a14="http://schemas.microsoft.com/office/drawing/2010/main" xmlns="" w="9525">
+                <a14:hiddenLine xmlns="" xmlns:a14="http://schemas.microsoft.com/office/drawing/2010/main" w="9525">
                   <a:solidFill>
                     <a:srgbClr val="000000"/>
                   </a:solidFill>
@@ -743,7 +748,7 @@
             </a:ln>
             <a:extLst>
               <a:ext uri="{91240B29-F687-4f45-9708-019B960494DF}">
-                <a14:hiddenLine xmlns:a14="http://schemas.microsoft.com/office/drawing/2010/main" xmlns="" w="9525">
+                <a14:hiddenLine xmlns="" xmlns:a14="http://schemas.microsoft.com/office/drawing/2010/main" w="9525">
                   <a:solidFill>
                     <a:srgbClr val="000000"/>
                   </a:solidFill>
@@ -805,7 +810,7 @@
             </a:ln>
             <a:extLst>
               <a:ext uri="{91240B29-F687-4f45-9708-019B960494DF}">
-                <a14:hiddenLine xmlns:a14="http://schemas.microsoft.com/office/drawing/2010/main" xmlns="" w="9525">
+                <a14:hiddenLine xmlns="" xmlns:a14="http://schemas.microsoft.com/office/drawing/2010/main" w="9525">
                   <a:solidFill>
                     <a:srgbClr val="000000"/>
                   </a:solidFill>
@@ -867,7 +872,7 @@
             </a:ln>
             <a:extLst>
               <a:ext uri="{91240B29-F687-4f45-9708-019B960494DF}">
-                <a14:hiddenLine xmlns:a14="http://schemas.microsoft.com/office/drawing/2010/main" xmlns="" w="9525">
+                <a14:hiddenLine xmlns="" xmlns:a14="http://schemas.microsoft.com/office/drawing/2010/main" w="9525">
                   <a:solidFill>
                     <a:srgbClr val="000000"/>
                   </a:solidFill>
@@ -957,7 +962,7 @@
             </a:ln>
             <a:extLst>
               <a:ext uri="{91240B29-F687-4f45-9708-019B960494DF}">
-                <a14:hiddenLine xmlns:a14="http://schemas.microsoft.com/office/drawing/2010/main" xmlns="" w="9525">
+                <a14:hiddenLine xmlns="" xmlns:a14="http://schemas.microsoft.com/office/drawing/2010/main" w="9525">
                   <a:solidFill>
                     <a:srgbClr val="000000"/>
                   </a:solidFill>
@@ -1047,7 +1052,7 @@
             </a:ln>
             <a:extLst>
               <a:ext uri="{91240B29-F687-4f45-9708-019B960494DF}">
-                <a14:hiddenLine xmlns:a14="http://schemas.microsoft.com/office/drawing/2010/main" xmlns="" w="9525">
+                <a14:hiddenLine xmlns="" xmlns:a14="http://schemas.microsoft.com/office/drawing/2010/main" w="9525">
                   <a:solidFill>
                     <a:srgbClr val="000000"/>
                   </a:solidFill>
@@ -1109,7 +1114,7 @@
             </a:ln>
             <a:extLst>
               <a:ext uri="{91240B29-F687-4f45-9708-019B960494DF}">
-                <a14:hiddenLine xmlns:a14="http://schemas.microsoft.com/office/drawing/2010/main" xmlns="" w="9525">
+                <a14:hiddenLine xmlns="" xmlns:a14="http://schemas.microsoft.com/office/drawing/2010/main" w="9525">
                   <a:solidFill>
                     <a:srgbClr val="000000"/>
                   </a:solidFill>
@@ -1219,7 +1224,7 @@
             </a:ln>
             <a:extLst>
               <a:ext uri="{91240B29-F687-4f45-9708-019B960494DF}">
-                <a14:hiddenLine xmlns:a14="http://schemas.microsoft.com/office/drawing/2010/main" xmlns="" w="9525">
+                <a14:hiddenLine xmlns="" xmlns:a14="http://schemas.microsoft.com/office/drawing/2010/main" w="9525">
                   <a:solidFill>
                     <a:srgbClr val="000000"/>
                   </a:solidFill>
@@ -1281,7 +1286,7 @@
             </a:ln>
             <a:extLst>
               <a:ext uri="{91240B29-F687-4f45-9708-019B960494DF}">
-                <a14:hiddenLine xmlns:a14="http://schemas.microsoft.com/office/drawing/2010/main" xmlns="" w="9525">
+                <a14:hiddenLine xmlns="" xmlns:a14="http://schemas.microsoft.com/office/drawing/2010/main" w="9525">
                   <a:solidFill>
                     <a:srgbClr val="000000"/>
                   </a:solidFill>
@@ -1371,7 +1376,7 @@
             </a:ln>
             <a:extLst>
               <a:ext uri="{91240B29-F687-4f45-9708-019B960494DF}">
-                <a14:hiddenLine xmlns:a14="http://schemas.microsoft.com/office/drawing/2010/main" xmlns="" w="9525">
+                <a14:hiddenLine xmlns="" xmlns:a14="http://schemas.microsoft.com/office/drawing/2010/main" w="9525">
                   <a:solidFill>
                     <a:srgbClr val="000000"/>
                   </a:solidFill>
@@ -1461,7 +1466,7 @@
             </a:ln>
             <a:extLst>
               <a:ext uri="{91240B29-F687-4f45-9708-019B960494DF}">
-                <a14:hiddenLine xmlns:a14="http://schemas.microsoft.com/office/drawing/2010/main" xmlns="" w="9525">
+                <a14:hiddenLine xmlns="" xmlns:a14="http://schemas.microsoft.com/office/drawing/2010/main" w="9525">
                   <a:solidFill>
                     <a:srgbClr val="000000"/>
                   </a:solidFill>
@@ -1523,7 +1528,7 @@
             </a:ln>
             <a:extLst>
               <a:ext uri="{91240B29-F687-4f45-9708-019B960494DF}">
-                <a14:hiddenLine xmlns:a14="http://schemas.microsoft.com/office/drawing/2010/main" xmlns="" w="9525">
+                <a14:hiddenLine xmlns="" xmlns:a14="http://schemas.microsoft.com/office/drawing/2010/main" w="9525">
                   <a:solidFill>
                     <a:srgbClr val="000000"/>
                   </a:solidFill>
@@ -1613,7 +1618,7 @@
             </a:ln>
             <a:extLst>
               <a:ext uri="{91240B29-F687-4f45-9708-019B960494DF}">
-                <a14:hiddenLine xmlns:a14="http://schemas.microsoft.com/office/drawing/2010/main" xmlns="" w="9525">
+                <a14:hiddenLine xmlns="" xmlns:a14="http://schemas.microsoft.com/office/drawing/2010/main" w="9525">
                   <a:solidFill>
                     <a:srgbClr val="000000"/>
                   </a:solidFill>
@@ -1703,7 +1708,7 @@
             </a:ln>
             <a:extLst>
               <a:ext uri="{91240B29-F687-4f45-9708-019B960494DF}">
-                <a14:hiddenLine xmlns:a14="http://schemas.microsoft.com/office/drawing/2010/main" xmlns="" w="9525">
+                <a14:hiddenLine xmlns="" xmlns:a14="http://schemas.microsoft.com/office/drawing/2010/main" w="9525">
                   <a:solidFill>
                     <a:srgbClr val="000000"/>
                   </a:solidFill>
@@ -1759,7 +1764,7 @@
             </a:ln>
             <a:extLst>
               <a:ext uri="{91240B29-F687-4f45-9708-019B960494DF}">
-                <a14:hiddenLine xmlns:a14="http://schemas.microsoft.com/office/drawing/2010/main" xmlns="" w="9525">
+                <a14:hiddenLine xmlns="" xmlns:a14="http://schemas.microsoft.com/office/drawing/2010/main" w="9525">
                   <a:solidFill>
                     <a:srgbClr val="000000"/>
                   </a:solidFill>
@@ -1849,7 +1854,7 @@
             </a:ln>
             <a:extLst>
               <a:ext uri="{91240B29-F687-4f45-9708-019B960494DF}">
-                <a14:hiddenLine xmlns:a14="http://schemas.microsoft.com/office/drawing/2010/main" xmlns="" w="9525">
+                <a14:hiddenLine xmlns="" xmlns:a14="http://schemas.microsoft.com/office/drawing/2010/main" w="9525">
                   <a:solidFill>
                     <a:srgbClr val="000000"/>
                   </a:solidFill>
@@ -1905,7 +1910,7 @@
             </a:ln>
             <a:extLst>
               <a:ext uri="{91240B29-F687-4f45-9708-019B960494DF}">
-                <a14:hiddenLine xmlns:a14="http://schemas.microsoft.com/office/drawing/2010/main" xmlns="" w="9525">
+                <a14:hiddenLine xmlns="" xmlns:a14="http://schemas.microsoft.com/office/drawing/2010/main" w="9525">
                   <a:solidFill>
                     <a:srgbClr val="000000"/>
                   </a:solidFill>
@@ -1995,7 +2000,7 @@
             </a:ln>
             <a:extLst>
               <a:ext uri="{91240B29-F687-4f45-9708-019B960494DF}">
-                <a14:hiddenLine xmlns:a14="http://schemas.microsoft.com/office/drawing/2010/main" xmlns="" w="9525">
+                <a14:hiddenLine xmlns="" xmlns:a14="http://schemas.microsoft.com/office/drawing/2010/main" w="9525">
                   <a:solidFill>
                     <a:srgbClr val="000000"/>
                   </a:solidFill>
@@ -2063,7 +2068,7 @@
             </a:ln>
             <a:extLst>
               <a:ext uri="{91240B29-F687-4f45-9708-019B960494DF}">
-                <a14:hiddenLine xmlns:a14="http://schemas.microsoft.com/office/drawing/2010/main" xmlns="" w="9525">
+                <a14:hiddenLine xmlns="" xmlns:a14="http://schemas.microsoft.com/office/drawing/2010/main" w="9525">
                   <a:solidFill>
                     <a:srgbClr val="000000"/>
                   </a:solidFill>
@@ -2153,7 +2158,7 @@
             </a:ln>
             <a:extLst>
               <a:ext uri="{91240B29-F687-4f45-9708-019B960494DF}">
-                <a14:hiddenLine xmlns:a14="http://schemas.microsoft.com/office/drawing/2010/main" xmlns="" w="9525">
+                <a14:hiddenLine xmlns="" xmlns:a14="http://schemas.microsoft.com/office/drawing/2010/main" w="9525">
                   <a:solidFill>
                     <a:srgbClr val="000000"/>
                   </a:solidFill>
@@ -2221,7 +2226,7 @@
             </a:ln>
             <a:extLst>
               <a:ext uri="{91240B29-F687-4f45-9708-019B960494DF}">
-                <a14:hiddenLine xmlns:a14="http://schemas.microsoft.com/office/drawing/2010/main" xmlns="" w="9525">
+                <a14:hiddenLine xmlns="" xmlns:a14="http://schemas.microsoft.com/office/drawing/2010/main" w="9525">
                   <a:solidFill>
                     <a:srgbClr val="000000"/>
                   </a:solidFill>
@@ -2311,7 +2316,7 @@
             </a:ln>
             <a:extLst>
               <a:ext uri="{91240B29-F687-4f45-9708-019B960494DF}">
-                <a14:hiddenLine xmlns:a14="http://schemas.microsoft.com/office/drawing/2010/main" xmlns="" w="9525">
+                <a14:hiddenLine xmlns="" xmlns:a14="http://schemas.microsoft.com/office/drawing/2010/main" w="9525">
                   <a:solidFill>
                     <a:srgbClr val="000000"/>
                   </a:solidFill>
@@ -2345,7 +2350,7 @@
             </a:ln>
             <a:extLst>
               <a:ext uri="{91240B29-F687-4f45-9708-019B960494DF}">
-                <a14:hiddenLine xmlns:a14="http://schemas.microsoft.com/office/drawing/2010/main" xmlns="" w="9525">
+                <a14:hiddenLine xmlns="" xmlns:a14="http://schemas.microsoft.com/office/drawing/2010/main" w="9525">
                   <a:solidFill>
                     <a:srgbClr val="000000"/>
                   </a:solidFill>
@@ -2435,7 +2440,7 @@
             </a:ln>
             <a:extLst>
               <a:ext uri="{91240B29-F687-4f45-9708-019B960494DF}">
-                <a14:hiddenLine xmlns:a14="http://schemas.microsoft.com/office/drawing/2010/main" xmlns="" w="9525">
+                <a14:hiddenLine xmlns="" xmlns:a14="http://schemas.microsoft.com/office/drawing/2010/main" w="9525">
                   <a:solidFill>
                     <a:srgbClr val="000000"/>
                   </a:solidFill>
@@ -2497,7 +2502,7 @@
             </a:ln>
             <a:extLst>
               <a:ext uri="{91240B29-F687-4f45-9708-019B960494DF}">
-                <a14:hiddenLine xmlns:a14="http://schemas.microsoft.com/office/drawing/2010/main" xmlns="" w="9525">
+                <a14:hiddenLine xmlns="" xmlns:a14="http://schemas.microsoft.com/office/drawing/2010/main" w="9525">
                   <a:solidFill>
                     <a:srgbClr val="000000"/>
                   </a:solidFill>
@@ -2559,7 +2564,7 @@
             </a:ln>
             <a:extLst>
               <a:ext uri="{91240B29-F687-4f45-9708-019B960494DF}">
-                <a14:hiddenLine xmlns:a14="http://schemas.microsoft.com/office/drawing/2010/main" xmlns="" w="9525">
+                <a14:hiddenLine xmlns="" xmlns:a14="http://schemas.microsoft.com/office/drawing/2010/main" w="9525">
                   <a:solidFill>
                     <a:srgbClr val="000000"/>
                   </a:solidFill>
@@ -2649,7 +2654,7 @@
             </a:ln>
             <a:extLst>
               <a:ext uri="{91240B29-F687-4f45-9708-019B960494DF}">
-                <a14:hiddenLine xmlns:a14="http://schemas.microsoft.com/office/drawing/2010/main" xmlns="" w="9525">
+                <a14:hiddenLine xmlns="" xmlns:a14="http://schemas.microsoft.com/office/drawing/2010/main" w="9525">
                   <a:solidFill>
                     <a:srgbClr val="000000"/>
                   </a:solidFill>
@@ -2717,7 +2722,7 @@
             </a:ln>
             <a:extLst>
               <a:ext uri="{91240B29-F687-4f45-9708-019B960494DF}">
-                <a14:hiddenLine xmlns:a14="http://schemas.microsoft.com/office/drawing/2010/main" xmlns="" w="9525">
+                <a14:hiddenLine xmlns="" xmlns:a14="http://schemas.microsoft.com/office/drawing/2010/main" w="9525">
                   <a:solidFill>
                     <a:srgbClr val="000000"/>
                   </a:solidFill>
@@ -2779,7 +2784,7 @@
             </a:ln>
             <a:extLst>
               <a:ext uri="{91240B29-F687-4f45-9708-019B960494DF}">
-                <a14:hiddenLine xmlns:a14="http://schemas.microsoft.com/office/drawing/2010/main" xmlns="" w="9525">
+                <a14:hiddenLine xmlns="" xmlns:a14="http://schemas.microsoft.com/office/drawing/2010/main" w="9525">
                   <a:solidFill>
                     <a:srgbClr val="000000"/>
                   </a:solidFill>
@@ -2869,7 +2874,7 @@
             </a:ln>
             <a:extLst>
               <a:ext uri="{91240B29-F687-4f45-9708-019B960494DF}">
-                <a14:hiddenLine xmlns:a14="http://schemas.microsoft.com/office/drawing/2010/main" xmlns="" w="9525">
+                <a14:hiddenLine xmlns="" xmlns:a14="http://schemas.microsoft.com/office/drawing/2010/main" w="9525">
                   <a:solidFill>
                     <a:srgbClr val="000000"/>
                   </a:solidFill>
@@ -2931,7 +2936,7 @@
             </a:ln>
             <a:extLst>
               <a:ext uri="{91240B29-F687-4f45-9708-019B960494DF}">
-                <a14:hiddenLine xmlns:a14="http://schemas.microsoft.com/office/drawing/2010/main" xmlns="" w="9525">
+                <a14:hiddenLine xmlns="" xmlns:a14="http://schemas.microsoft.com/office/drawing/2010/main" w="9525">
                   <a:solidFill>
                     <a:srgbClr val="000000"/>
                   </a:solidFill>
@@ -3021,7 +3026,7 @@
             </a:ln>
             <a:extLst>
               <a:ext uri="{91240B29-F687-4f45-9708-019B960494DF}">
-                <a14:hiddenLine xmlns:a14="http://schemas.microsoft.com/office/drawing/2010/main" xmlns="" w="9525">
+                <a14:hiddenLine xmlns="" xmlns:a14="http://schemas.microsoft.com/office/drawing/2010/main" w="9525">
                   <a:solidFill>
                     <a:srgbClr val="000000"/>
                   </a:solidFill>
@@ -3083,7 +3088,7 @@
             </a:ln>
             <a:extLst>
               <a:ext uri="{91240B29-F687-4f45-9708-019B960494DF}">
-                <a14:hiddenLine xmlns:a14="http://schemas.microsoft.com/office/drawing/2010/main" xmlns="" w="9525">
+                <a14:hiddenLine xmlns="" xmlns:a14="http://schemas.microsoft.com/office/drawing/2010/main" w="9525">
                   <a:solidFill>
                     <a:srgbClr val="000000"/>
                   </a:solidFill>
@@ -3173,7 +3178,7 @@
             </a:ln>
             <a:extLst>
               <a:ext uri="{91240B29-F687-4f45-9708-019B960494DF}">
-                <a14:hiddenLine xmlns:a14="http://schemas.microsoft.com/office/drawing/2010/main" xmlns="" w="9525">
+                <a14:hiddenLine xmlns="" xmlns:a14="http://schemas.microsoft.com/office/drawing/2010/main" w="9525">
                   <a:solidFill>
                     <a:srgbClr val="000000"/>
                   </a:solidFill>
@@ -3207,7 +3212,7 @@
             </a:ln>
             <a:extLst>
               <a:ext uri="{91240B29-F687-4f45-9708-019B960494DF}">
-                <a14:hiddenLine xmlns:a14="http://schemas.microsoft.com/office/drawing/2010/main" xmlns="" w="9525">
+                <a14:hiddenLine xmlns="" xmlns:a14="http://schemas.microsoft.com/office/drawing/2010/main" w="9525">
                   <a:solidFill>
                     <a:srgbClr val="000000"/>
                   </a:solidFill>
@@ -3272,7 +3277,7 @@
             </a:ln>
             <a:extLst>
               <a:ext uri="{91240B29-F687-4f45-9708-019B960494DF}">
-                <a14:hiddenLine xmlns:a14="http://schemas.microsoft.com/office/drawing/2010/main" xmlns="" w="9525">
+                <a14:hiddenLine xmlns="" xmlns:a14="http://schemas.microsoft.com/office/drawing/2010/main" w="9525">
                   <a:solidFill>
                     <a:srgbClr val="000000"/>
                   </a:solidFill>
@@ -3362,7 +3367,7 @@
             </a:ln>
             <a:extLst>
               <a:ext uri="{91240B29-F687-4f45-9708-019B960494DF}">
-                <a14:hiddenLine xmlns:a14="http://schemas.microsoft.com/office/drawing/2010/main" xmlns="" w="9525">
+                <a14:hiddenLine xmlns="" xmlns:a14="http://schemas.microsoft.com/office/drawing/2010/main" w="9525">
                   <a:solidFill>
                     <a:srgbClr val="000000"/>
                   </a:solidFill>
@@ -3424,7 +3429,7 @@
             </a:ln>
             <a:extLst>
               <a:ext uri="{91240B29-F687-4f45-9708-019B960494DF}">
-                <a14:hiddenLine xmlns:a14="http://schemas.microsoft.com/office/drawing/2010/main" xmlns="" w="9525">
+                <a14:hiddenLine xmlns="" xmlns:a14="http://schemas.microsoft.com/office/drawing/2010/main" w="9525">
                   <a:solidFill>
                     <a:srgbClr val="000000"/>
                   </a:solidFill>
@@ -3514,7 +3519,7 @@
             </a:ln>
             <a:extLst>
               <a:ext uri="{91240B29-F687-4f45-9708-019B960494DF}">
-                <a14:hiddenLine xmlns:a14="http://schemas.microsoft.com/office/drawing/2010/main" xmlns="" w="9525">
+                <a14:hiddenLine xmlns="" xmlns:a14="http://schemas.microsoft.com/office/drawing/2010/main" w="9525">
                   <a:solidFill>
                     <a:srgbClr val="000000"/>
                   </a:solidFill>
@@ -3604,7 +3609,7 @@
             </a:ln>
             <a:extLst>
               <a:ext uri="{91240B29-F687-4f45-9708-019B960494DF}">
-                <a14:hiddenLine xmlns:a14="http://schemas.microsoft.com/office/drawing/2010/main" xmlns="" w="9525">
+                <a14:hiddenLine xmlns="" xmlns:a14="http://schemas.microsoft.com/office/drawing/2010/main" w="9525">
                   <a:solidFill>
                     <a:srgbClr val="000000"/>
                   </a:solidFill>
@@ -3669,7 +3674,7 @@
             </a:ln>
             <a:extLst>
               <a:ext uri="{91240B29-F687-4f45-9708-019B960494DF}">
-                <a14:hiddenLine xmlns:a14="http://schemas.microsoft.com/office/drawing/2010/main" xmlns="" w="9525">
+                <a14:hiddenLine xmlns="" xmlns:a14="http://schemas.microsoft.com/office/drawing/2010/main" w="9525">
                   <a:solidFill>
                     <a:srgbClr val="000000"/>
                   </a:solidFill>
@@ -3731,7 +3736,7 @@
             </a:ln>
             <a:extLst>
               <a:ext uri="{91240B29-F687-4f45-9708-019B960494DF}">
-                <a14:hiddenLine xmlns:a14="http://schemas.microsoft.com/office/drawing/2010/main" xmlns="" w="9525">
+                <a14:hiddenLine xmlns="" xmlns:a14="http://schemas.microsoft.com/office/drawing/2010/main" w="9525">
                   <a:solidFill>
                     <a:srgbClr val="000000"/>
                   </a:solidFill>
@@ -3821,7 +3826,7 @@
             </a:ln>
             <a:extLst>
               <a:ext uri="{91240B29-F687-4f45-9708-019B960494DF}">
-                <a14:hiddenLine xmlns:a14="http://schemas.microsoft.com/office/drawing/2010/main" xmlns="" w="9525">
+                <a14:hiddenLine xmlns="" xmlns:a14="http://schemas.microsoft.com/office/drawing/2010/main" w="9525">
                   <a:solidFill>
                     <a:srgbClr val="000000"/>
                   </a:solidFill>
@@ -3911,7 +3916,7 @@
             </a:ln>
             <a:extLst>
               <a:ext uri="{91240B29-F687-4f45-9708-019B960494DF}">
-                <a14:hiddenLine xmlns:a14="http://schemas.microsoft.com/office/drawing/2010/main" xmlns="" w="9525">
+                <a14:hiddenLine xmlns="" xmlns:a14="http://schemas.microsoft.com/office/drawing/2010/main" w="9525">
                   <a:solidFill>
                     <a:srgbClr val="000000"/>
                   </a:solidFill>
@@ -3973,7 +3978,7 @@
             </a:ln>
             <a:extLst>
               <a:ext uri="{91240B29-F687-4f45-9708-019B960494DF}">
-                <a14:hiddenLine xmlns:a14="http://schemas.microsoft.com/office/drawing/2010/main" xmlns="" w="9525">
+                <a14:hiddenLine xmlns="" xmlns:a14="http://schemas.microsoft.com/office/drawing/2010/main" w="9525">
                   <a:solidFill>
                     <a:srgbClr val="000000"/>
                   </a:solidFill>
@@ -4093,7 +4098,7 @@
             </a:ln>
             <a:extLst>
               <a:ext uri="{91240B29-F687-4f45-9708-019B960494DF}">
-                <a14:hiddenLine xmlns:a14="http://schemas.microsoft.com/office/drawing/2010/main" xmlns="" w="9525">
+                <a14:hiddenLine xmlns="" xmlns:a14="http://schemas.microsoft.com/office/drawing/2010/main" w="9525">
                   <a:solidFill>
                     <a:srgbClr val="000000"/>
                   </a:solidFill>
@@ -4161,7 +4166,7 @@
             </a:ln>
             <a:extLst>
               <a:ext uri="{91240B29-F687-4f45-9708-019B960494DF}">
-                <a14:hiddenLine xmlns:a14="http://schemas.microsoft.com/office/drawing/2010/main" xmlns="" w="9525">
+                <a14:hiddenLine xmlns="" xmlns:a14="http://schemas.microsoft.com/office/drawing/2010/main" w="9525">
                   <a:solidFill>
                     <a:srgbClr val="000000"/>
                   </a:solidFill>
@@ -4251,7 +4256,7 @@
             </a:ln>
             <a:extLst>
               <a:ext uri="{91240B29-F687-4f45-9708-019B960494DF}">
-                <a14:hiddenLine xmlns:a14="http://schemas.microsoft.com/office/drawing/2010/main" xmlns="" w="9525">
+                <a14:hiddenLine xmlns="" xmlns:a14="http://schemas.microsoft.com/office/drawing/2010/main" w="9525">
                   <a:solidFill>
                     <a:srgbClr val="000000"/>
                   </a:solidFill>
@@ -8973,7 +8978,7 @@
           <a:noFill/>
           <a:extLst>
             <a:ext uri="{909E8E84-426E-40dd-AFC4-6F175D3DCCD1}">
-              <a14:hiddenFill xmlns:a14="http://schemas.microsoft.com/office/drawing/2010/main" xmlns="">
+              <a14:hiddenFill xmlns="" xmlns:a14="http://schemas.microsoft.com/office/drawing/2010/main">
                 <a:solidFill>
                   <a:srgbClr val="FFFFFF"/>
                 </a:solidFill>
@@ -9047,7 +9052,7 @@
               </a:ln>
               <a:extLst>
                 <a:ext uri="{91240B29-F687-4f45-9708-019B960494DF}">
-                  <a14:hiddenLine xmlns:a14="http://schemas.microsoft.com/office/drawing/2010/main" xmlns="" w="9525">
+                  <a14:hiddenLine xmlns="" xmlns:a14="http://schemas.microsoft.com/office/drawing/2010/main" w="9525">
                     <a:solidFill>
                       <a:srgbClr val="000000"/>
                     </a:solidFill>
@@ -9137,7 +9142,7 @@
               </a:ln>
               <a:extLst>
                 <a:ext uri="{91240B29-F687-4f45-9708-019B960494DF}">
-                  <a14:hiddenLine xmlns:a14="http://schemas.microsoft.com/office/drawing/2010/main" xmlns="" w="9525">
+                  <a14:hiddenLine xmlns="" xmlns:a14="http://schemas.microsoft.com/office/drawing/2010/main" w="9525">
                     <a:solidFill>
                       <a:srgbClr val="000000"/>
                     </a:solidFill>
@@ -9227,7 +9232,7 @@
               </a:ln>
               <a:extLst>
                 <a:ext uri="{91240B29-F687-4f45-9708-019B960494DF}">
-                  <a14:hiddenLine xmlns:a14="http://schemas.microsoft.com/office/drawing/2010/main" xmlns="" w="9525">
+                  <a14:hiddenLine xmlns="" xmlns:a14="http://schemas.microsoft.com/office/drawing/2010/main" w="9525">
                     <a:solidFill>
                       <a:srgbClr val="000000"/>
                     </a:solidFill>
@@ -9289,7 +9294,7 @@
               </a:ln>
               <a:extLst>
                 <a:ext uri="{91240B29-F687-4f45-9708-019B960494DF}">
-                  <a14:hiddenLine xmlns:a14="http://schemas.microsoft.com/office/drawing/2010/main" xmlns="" w="9525">
+                  <a14:hiddenLine xmlns="" xmlns:a14="http://schemas.microsoft.com/office/drawing/2010/main" w="9525">
                     <a:solidFill>
                       <a:srgbClr val="000000"/>
                     </a:solidFill>
@@ -9379,7 +9384,7 @@
               </a:ln>
               <a:extLst>
                 <a:ext uri="{91240B29-F687-4f45-9708-019B960494DF}">
-                  <a14:hiddenLine xmlns:a14="http://schemas.microsoft.com/office/drawing/2010/main" xmlns="" w="9525">
+                  <a14:hiddenLine xmlns="" xmlns:a14="http://schemas.microsoft.com/office/drawing/2010/main" w="9525">
                     <a:solidFill>
                       <a:srgbClr val="000000"/>
                     </a:solidFill>
@@ -9441,7 +9446,7 @@
               </a:ln>
               <a:extLst>
                 <a:ext uri="{91240B29-F687-4f45-9708-019B960494DF}">
-                  <a14:hiddenLine xmlns:a14="http://schemas.microsoft.com/office/drawing/2010/main" xmlns="" w="9525">
+                  <a14:hiddenLine xmlns="" xmlns:a14="http://schemas.microsoft.com/office/drawing/2010/main" w="9525">
                     <a:solidFill>
                       <a:srgbClr val="000000"/>
                     </a:solidFill>
@@ -9503,7 +9508,7 @@
               </a:ln>
               <a:extLst>
                 <a:ext uri="{91240B29-F687-4f45-9708-019B960494DF}">
-                  <a14:hiddenLine xmlns:a14="http://schemas.microsoft.com/office/drawing/2010/main" xmlns="" w="9525">
+                  <a14:hiddenLine xmlns="" xmlns:a14="http://schemas.microsoft.com/office/drawing/2010/main" w="9525">
                     <a:solidFill>
                       <a:srgbClr val="000000"/>
                     </a:solidFill>
@@ -9593,7 +9598,7 @@
               </a:ln>
               <a:extLst>
                 <a:ext uri="{91240B29-F687-4f45-9708-019B960494DF}">
-                  <a14:hiddenLine xmlns:a14="http://schemas.microsoft.com/office/drawing/2010/main" xmlns="" w="9525">
+                  <a14:hiddenLine xmlns="" xmlns:a14="http://schemas.microsoft.com/office/drawing/2010/main" w="9525">
                     <a:solidFill>
                       <a:srgbClr val="000000"/>
                     </a:solidFill>
@@ -9683,7 +9688,7 @@
               </a:ln>
               <a:extLst>
                 <a:ext uri="{91240B29-F687-4f45-9708-019B960494DF}">
-                  <a14:hiddenLine xmlns:a14="http://schemas.microsoft.com/office/drawing/2010/main" xmlns="" w="9525">
+                  <a14:hiddenLine xmlns="" xmlns:a14="http://schemas.microsoft.com/office/drawing/2010/main" w="9525">
                     <a:solidFill>
                       <a:srgbClr val="000000"/>
                     </a:solidFill>
@@ -9745,7 +9750,7 @@
               </a:ln>
               <a:extLst>
                 <a:ext uri="{91240B29-F687-4f45-9708-019B960494DF}">
-                  <a14:hiddenLine xmlns:a14="http://schemas.microsoft.com/office/drawing/2010/main" xmlns="" w="9525">
+                  <a14:hiddenLine xmlns="" xmlns:a14="http://schemas.microsoft.com/office/drawing/2010/main" w="9525">
                     <a:solidFill>
                       <a:srgbClr val="000000"/>
                     </a:solidFill>
@@ -9855,7 +9860,7 @@
               </a:ln>
               <a:extLst>
                 <a:ext uri="{91240B29-F687-4f45-9708-019B960494DF}">
-                  <a14:hiddenLine xmlns:a14="http://schemas.microsoft.com/office/drawing/2010/main" xmlns="" w="9525">
+                  <a14:hiddenLine xmlns="" xmlns:a14="http://schemas.microsoft.com/office/drawing/2010/main" w="9525">
                     <a:solidFill>
                       <a:srgbClr val="000000"/>
                     </a:solidFill>
@@ -9939,7 +9944,7 @@
               </a:ln>
               <a:extLst>
                 <a:ext uri="{91240B29-F687-4f45-9708-019B960494DF}">
-                  <a14:hiddenLine xmlns:a14="http://schemas.microsoft.com/office/drawing/2010/main" xmlns="" w="9525">
+                  <a14:hiddenLine xmlns="" xmlns:a14="http://schemas.microsoft.com/office/drawing/2010/main" w="9525">
                     <a:solidFill>
                       <a:srgbClr val="000000"/>
                     </a:solidFill>
@@ -10001,7 +10006,7 @@
               </a:ln>
               <a:extLst>
                 <a:ext uri="{91240B29-F687-4f45-9708-019B960494DF}">
-                  <a14:hiddenLine xmlns:a14="http://schemas.microsoft.com/office/drawing/2010/main" xmlns="" w="9525">
+                  <a14:hiddenLine xmlns="" xmlns:a14="http://schemas.microsoft.com/office/drawing/2010/main" w="9525">
                     <a:solidFill>
                       <a:srgbClr val="000000"/>
                     </a:solidFill>
@@ -10063,7 +10068,7 @@
               </a:ln>
               <a:extLst>
                 <a:ext uri="{91240B29-F687-4f45-9708-019B960494DF}">
-                  <a14:hiddenLine xmlns:a14="http://schemas.microsoft.com/office/drawing/2010/main" xmlns="" w="9525">
+                  <a14:hiddenLine xmlns="" xmlns:a14="http://schemas.microsoft.com/office/drawing/2010/main" w="9525">
                     <a:solidFill>
                       <a:srgbClr val="000000"/>
                     </a:solidFill>
@@ -10153,7 +10158,7 @@
               </a:ln>
               <a:extLst>
                 <a:ext uri="{91240B29-F687-4f45-9708-019B960494DF}">
-                  <a14:hiddenLine xmlns:a14="http://schemas.microsoft.com/office/drawing/2010/main" xmlns="" w="9525">
+                  <a14:hiddenLine xmlns="" xmlns:a14="http://schemas.microsoft.com/office/drawing/2010/main" w="9525">
                     <a:solidFill>
                       <a:srgbClr val="000000"/>
                     </a:solidFill>
@@ -10187,7 +10192,7 @@
               </a:ln>
               <a:extLst>
                 <a:ext uri="{91240B29-F687-4f45-9708-019B960494DF}">
-                  <a14:hiddenLine xmlns:a14="http://schemas.microsoft.com/office/drawing/2010/main" xmlns="" w="9525">
+                  <a14:hiddenLine xmlns="" xmlns:a14="http://schemas.microsoft.com/office/drawing/2010/main" w="9525">
                     <a:solidFill>
                       <a:srgbClr val="000000"/>
                     </a:solidFill>
@@ -10252,7 +10257,7 @@
               </a:ln>
               <a:extLst>
                 <a:ext uri="{91240B29-F687-4f45-9708-019B960494DF}">
-                  <a14:hiddenLine xmlns:a14="http://schemas.microsoft.com/office/drawing/2010/main" xmlns="" w="9525">
+                  <a14:hiddenLine xmlns="" xmlns:a14="http://schemas.microsoft.com/office/drawing/2010/main" w="9525">
                     <a:solidFill>
                       <a:srgbClr val="000000"/>
                     </a:solidFill>
@@ -10342,7 +10347,7 @@
               </a:ln>
               <a:extLst>
                 <a:ext uri="{91240B29-F687-4f45-9708-019B960494DF}">
-                  <a14:hiddenLine xmlns:a14="http://schemas.microsoft.com/office/drawing/2010/main" xmlns="" w="9525">
+                  <a14:hiddenLine xmlns="" xmlns:a14="http://schemas.microsoft.com/office/drawing/2010/main" w="9525">
                     <a:solidFill>
                       <a:srgbClr val="000000"/>
                     </a:solidFill>
@@ -10404,7 +10409,7 @@
               </a:ln>
               <a:extLst>
                 <a:ext uri="{91240B29-F687-4f45-9708-019B960494DF}">
-                  <a14:hiddenLine xmlns:a14="http://schemas.microsoft.com/office/drawing/2010/main" xmlns="" w="9525">
+                  <a14:hiddenLine xmlns="" xmlns:a14="http://schemas.microsoft.com/office/drawing/2010/main" w="9525">
                     <a:solidFill>
                       <a:srgbClr val="000000"/>
                     </a:solidFill>
@@ -10494,7 +10499,7 @@
               </a:ln>
               <a:extLst>
                 <a:ext uri="{91240B29-F687-4f45-9708-019B960494DF}">
-                  <a14:hiddenLine xmlns:a14="http://schemas.microsoft.com/office/drawing/2010/main" xmlns="" w="9525">
+                  <a14:hiddenLine xmlns="" xmlns:a14="http://schemas.microsoft.com/office/drawing/2010/main" w="9525">
                     <a:solidFill>
                       <a:srgbClr val="000000"/>
                     </a:solidFill>
@@ -10559,7 +10564,7 @@
               </a:ln>
               <a:extLst>
                 <a:ext uri="{91240B29-F687-4f45-9708-019B960494DF}">
-                  <a14:hiddenLine xmlns:a14="http://schemas.microsoft.com/office/drawing/2010/main" xmlns="" w="9525">
+                  <a14:hiddenLine xmlns="" xmlns:a14="http://schemas.microsoft.com/office/drawing/2010/main" w="9525">
                     <a:solidFill>
                       <a:srgbClr val="000000"/>
                     </a:solidFill>
@@ -10621,7 +10626,7 @@
               </a:ln>
               <a:extLst>
                 <a:ext uri="{91240B29-F687-4f45-9708-019B960494DF}">
-                  <a14:hiddenLine xmlns:a14="http://schemas.microsoft.com/office/drawing/2010/main" xmlns="" w="9525">
+                  <a14:hiddenLine xmlns="" xmlns:a14="http://schemas.microsoft.com/office/drawing/2010/main" w="9525">
                     <a:solidFill>
                       <a:srgbClr val="000000"/>
                     </a:solidFill>
@@ -10711,7 +10716,7 @@
               </a:ln>
               <a:extLst>
                 <a:ext uri="{91240B29-F687-4f45-9708-019B960494DF}">
-                  <a14:hiddenLine xmlns:a14="http://schemas.microsoft.com/office/drawing/2010/main" xmlns="" w="9525">
+                  <a14:hiddenLine xmlns="" xmlns:a14="http://schemas.microsoft.com/office/drawing/2010/main" w="9525">
                     <a:solidFill>
                       <a:srgbClr val="000000"/>
                     </a:solidFill>
@@ -10801,7 +10806,7 @@
               </a:ln>
               <a:extLst>
                 <a:ext uri="{91240B29-F687-4f45-9708-019B960494DF}">
-                  <a14:hiddenLine xmlns:a14="http://schemas.microsoft.com/office/drawing/2010/main" xmlns="" w="9525">
+                  <a14:hiddenLine xmlns="" xmlns:a14="http://schemas.microsoft.com/office/drawing/2010/main" w="9525">
                     <a:solidFill>
                       <a:srgbClr val="000000"/>
                     </a:solidFill>
@@ -10866,7 +10871,7 @@
               </a:ln>
               <a:extLst>
                 <a:ext uri="{91240B29-F687-4f45-9708-019B960494DF}">
-                  <a14:hiddenLine xmlns:a14="http://schemas.microsoft.com/office/drawing/2010/main" xmlns="" w="9525">
+                  <a14:hiddenLine xmlns="" xmlns:a14="http://schemas.microsoft.com/office/drawing/2010/main" w="9525">
                     <a:solidFill>
                       <a:srgbClr val="000000"/>
                     </a:solidFill>
@@ -10986,7 +10991,7 @@
               </a:ln>
               <a:extLst>
                 <a:ext uri="{91240B29-F687-4f45-9708-019B960494DF}">
-                  <a14:hiddenLine xmlns:a14="http://schemas.microsoft.com/office/drawing/2010/main" xmlns="" w="9525">
+                  <a14:hiddenLine xmlns="" xmlns:a14="http://schemas.microsoft.com/office/drawing/2010/main" w="9525">
                     <a:solidFill>
                       <a:srgbClr val="000000"/>
                     </a:solidFill>
@@ -11084,7 +11089,7 @@
               </a:ln>
               <a:extLst>
                 <a:ext uri="{91240B29-F687-4f45-9708-019B960494DF}">
-                  <a14:hiddenLine xmlns:a14="http://schemas.microsoft.com/office/drawing/2010/main" xmlns="" w="9525">
+                  <a14:hiddenLine xmlns="" xmlns:a14="http://schemas.microsoft.com/office/drawing/2010/main" w="9525">
                     <a:solidFill>
                       <a:srgbClr val="000000"/>
                     </a:solidFill>
@@ -11199,7 +11204,7 @@
               </a:ln>
               <a:extLst>
                 <a:ext uri="{91240B29-F687-4f45-9708-019B960494DF}">
-                  <a14:hiddenLine xmlns:a14="http://schemas.microsoft.com/office/drawing/2010/main" xmlns="" w="9525">
+                  <a14:hiddenLine xmlns="" xmlns:a14="http://schemas.microsoft.com/office/drawing/2010/main" w="9525">
                     <a:solidFill>
                       <a:srgbClr val="000000"/>
                     </a:solidFill>
@@ -11289,7 +11294,7 @@
               </a:ln>
               <a:extLst>
                 <a:ext uri="{91240B29-F687-4f45-9708-019B960494DF}">
-                  <a14:hiddenLine xmlns:a14="http://schemas.microsoft.com/office/drawing/2010/main" xmlns="" w="9525">
+                  <a14:hiddenLine xmlns="" xmlns:a14="http://schemas.microsoft.com/office/drawing/2010/main" w="9525">
                     <a:solidFill>
                       <a:srgbClr val="000000"/>
                     </a:solidFill>
@@ -11354,7 +11359,7 @@
               </a:ln>
               <a:extLst>
                 <a:ext uri="{91240B29-F687-4f45-9708-019B960494DF}">
-                  <a14:hiddenLine xmlns:a14="http://schemas.microsoft.com/office/drawing/2010/main" xmlns="" w="9525">
+                  <a14:hiddenLine xmlns="" xmlns:a14="http://schemas.microsoft.com/office/drawing/2010/main" w="9525">
                     <a:solidFill>
                       <a:srgbClr val="000000"/>
                     </a:solidFill>
@@ -11444,7 +11449,7 @@
               </a:ln>
               <a:extLst>
                 <a:ext uri="{91240B29-F687-4f45-9708-019B960494DF}">
-                  <a14:hiddenLine xmlns:a14="http://schemas.microsoft.com/office/drawing/2010/main" xmlns="" w="9525">
+                  <a14:hiddenLine xmlns="" xmlns:a14="http://schemas.microsoft.com/office/drawing/2010/main" w="9525">
                     <a:solidFill>
                       <a:srgbClr val="000000"/>
                     </a:solidFill>
@@ -11512,7 +11517,7 @@
               </a:ln>
               <a:extLst>
                 <a:ext uri="{91240B29-F687-4f45-9708-019B960494DF}">
-                  <a14:hiddenLine xmlns:a14="http://schemas.microsoft.com/office/drawing/2010/main" xmlns="" w="9525">
+                  <a14:hiddenLine xmlns="" xmlns:a14="http://schemas.microsoft.com/office/drawing/2010/main" w="9525">
                     <a:solidFill>
                       <a:srgbClr val="000000"/>
                     </a:solidFill>
@@ -11602,7 +11607,7 @@
               </a:ln>
               <a:extLst>
                 <a:ext uri="{91240B29-F687-4f45-9708-019B960494DF}">
-                  <a14:hiddenLine xmlns:a14="http://schemas.microsoft.com/office/drawing/2010/main" xmlns="" w="9525">
+                  <a14:hiddenLine xmlns="" xmlns:a14="http://schemas.microsoft.com/office/drawing/2010/main" w="9525">
                     <a:solidFill>
                       <a:srgbClr val="000000"/>
                     </a:solidFill>
@@ -11670,7 +11675,7 @@
               </a:ln>
               <a:extLst>
                 <a:ext uri="{91240B29-F687-4f45-9708-019B960494DF}">
-                  <a14:hiddenLine xmlns:a14="http://schemas.microsoft.com/office/drawing/2010/main" xmlns="" w="9525">
+                  <a14:hiddenLine xmlns="" xmlns:a14="http://schemas.microsoft.com/office/drawing/2010/main" w="9525">
                     <a:solidFill>
                       <a:srgbClr val="000000"/>
                     </a:solidFill>
@@ -11760,7 +11765,7 @@
               </a:ln>
               <a:extLst>
                 <a:ext uri="{91240B29-F687-4f45-9708-019B960494DF}">
-                  <a14:hiddenLine xmlns:a14="http://schemas.microsoft.com/office/drawing/2010/main" xmlns="" w="9525">
+                  <a14:hiddenLine xmlns="" xmlns:a14="http://schemas.microsoft.com/office/drawing/2010/main" w="9525">
                     <a:solidFill>
                       <a:srgbClr val="000000"/>
                     </a:solidFill>
@@ -11794,7 +11799,7 @@
               </a:ln>
               <a:extLst>
                 <a:ext uri="{91240B29-F687-4f45-9708-019B960494DF}">
-                  <a14:hiddenLine xmlns:a14="http://schemas.microsoft.com/office/drawing/2010/main" xmlns="" w="9525">
+                  <a14:hiddenLine xmlns="" xmlns:a14="http://schemas.microsoft.com/office/drawing/2010/main" w="9525">
                     <a:solidFill>
                       <a:srgbClr val="000000"/>
                     </a:solidFill>
@@ -12411,8 +12416,13 @@
           <a:p>
             <a:r>
               <a:rPr lang="fi-FI" dirty="0"/>
-              <a:t>Ian Tammis </a:t>
+              <a:t>Ian </a:t>
             </a:r>
+            <a:r>
+              <a:rPr lang="fi-FI" dirty="0" smtClean="0"/>
+              <a:t>Timmis </a:t>
+            </a:r>
+            <a:endParaRPr lang="fi-FI" dirty="0"/>
           </a:p>
           <a:p>
             <a:r>
@@ -12436,6 +12446,13 @@
   <p:clrMapOvr>
     <a:masterClrMapping/>
   </p:clrMapOvr>
+  <p:timing>
+    <p:tnLst>
+      <p:par>
+        <p:cTn id="1" dur="indefinite" restart="never" nodeType="tmRoot"/>
+      </p:par>
+    </p:tnLst>
+  </p:timing>
 </p:sld>
 </file>
 
@@ -12542,6 +12559,13 @@
   <p:clrMapOvr>
     <a:masterClrMapping/>
   </p:clrMapOvr>
+  <p:timing>
+    <p:tnLst>
+      <p:par>
+        <p:cTn id="1" dur="indefinite" restart="never" nodeType="tmRoot"/>
+      </p:par>
+    </p:tnLst>
+  </p:timing>
 </p:sld>
 </file>
 
@@ -12664,6 +12688,13 @@
   <p:clrMapOvr>
     <a:masterClrMapping/>
   </p:clrMapOvr>
+  <p:timing>
+    <p:tnLst>
+      <p:par>
+        <p:cTn id="1" dur="indefinite" restart="never" nodeType="tmRoot"/>
+      </p:par>
+    </p:tnLst>
+  </p:timing>
 </p:sld>
 </file>
 
@@ -12746,6 +12777,13 @@
   <p:clrMapOvr>
     <a:masterClrMapping/>
   </p:clrMapOvr>
+  <p:timing>
+    <p:tnLst>
+      <p:par>
+        <p:cTn id="1" dur="indefinite" restart="never" nodeType="tmRoot"/>
+      </p:par>
+    </p:tnLst>
+  </p:timing>
 </p:sld>
 </file>
 
@@ -12860,6 +12898,13 @@
   <p:clrMapOvr>
     <a:masterClrMapping/>
   </p:clrMapOvr>
+  <p:timing>
+    <p:tnLst>
+      <p:par>
+        <p:cTn id="1" dur="indefinite" restart="never" nodeType="tmRoot"/>
+      </p:par>
+    </p:tnLst>
+  </p:timing>
 </p:sld>
 </file>
 
@@ -12974,6 +13019,13 @@
   <p:clrMapOvr>
     <a:masterClrMapping/>
   </p:clrMapOvr>
+  <p:timing>
+    <p:tnLst>
+      <p:par>
+        <p:cTn id="1" dur="indefinite" restart="never" nodeType="tmRoot"/>
+      </p:par>
+    </p:tnLst>
+  </p:timing>
 </p:sld>
 </file>
 

</xml_diff>